<commit_message>
edit powerpoint + swagger for patch
</commit_message>
<xml_diff>
--- a/P13.pptx
+++ b/P13.pptx
@@ -2669,7 +2669,7 @@
           <a:p>
             <a:fld id="{6A4922AC-46CB-49BF-90C3-10269EC4F5A8}" type="datetimeFigureOut">
               <a:rPr lang="fr-FR" smtClean="0"/>
-              <a:t>06/09/2023</a:t>
+              <a:t>07/09/2023</a:t>
             </a:fld>
             <a:endParaRPr lang="fr-FR"/>
           </a:p>
@@ -2867,7 +2867,7 @@
           <a:p>
             <a:fld id="{6A4922AC-46CB-49BF-90C3-10269EC4F5A8}" type="datetimeFigureOut">
               <a:rPr lang="fr-FR" smtClean="0"/>
-              <a:t>06/09/2023</a:t>
+              <a:t>07/09/2023</a:t>
             </a:fld>
             <a:endParaRPr lang="fr-FR"/>
           </a:p>
@@ -3075,7 +3075,7 @@
           <a:p>
             <a:fld id="{6A4922AC-46CB-49BF-90C3-10269EC4F5A8}" type="datetimeFigureOut">
               <a:rPr lang="fr-FR" smtClean="0"/>
-              <a:t>06/09/2023</a:t>
+              <a:t>07/09/2023</a:t>
             </a:fld>
             <a:endParaRPr lang="fr-FR"/>
           </a:p>
@@ -3273,7 +3273,7 @@
           <a:p>
             <a:fld id="{6A4922AC-46CB-49BF-90C3-10269EC4F5A8}" type="datetimeFigureOut">
               <a:rPr lang="fr-FR" smtClean="0"/>
-              <a:t>06/09/2023</a:t>
+              <a:t>07/09/2023</a:t>
             </a:fld>
             <a:endParaRPr lang="fr-FR"/>
           </a:p>
@@ -3548,7 +3548,7 @@
           <a:p>
             <a:fld id="{6A4922AC-46CB-49BF-90C3-10269EC4F5A8}" type="datetimeFigureOut">
               <a:rPr lang="fr-FR" smtClean="0"/>
-              <a:t>06/09/2023</a:t>
+              <a:t>07/09/2023</a:t>
             </a:fld>
             <a:endParaRPr lang="fr-FR"/>
           </a:p>
@@ -3813,7 +3813,7 @@
           <a:p>
             <a:fld id="{6A4922AC-46CB-49BF-90C3-10269EC4F5A8}" type="datetimeFigureOut">
               <a:rPr lang="fr-FR" smtClean="0"/>
-              <a:t>06/09/2023</a:t>
+              <a:t>07/09/2023</a:t>
             </a:fld>
             <a:endParaRPr lang="fr-FR"/>
           </a:p>
@@ -4225,7 +4225,7 @@
           <a:p>
             <a:fld id="{6A4922AC-46CB-49BF-90C3-10269EC4F5A8}" type="datetimeFigureOut">
               <a:rPr lang="fr-FR" smtClean="0"/>
-              <a:t>06/09/2023</a:t>
+              <a:t>07/09/2023</a:t>
             </a:fld>
             <a:endParaRPr lang="fr-FR"/>
           </a:p>
@@ -4366,7 +4366,7 @@
           <a:p>
             <a:fld id="{6A4922AC-46CB-49BF-90C3-10269EC4F5A8}" type="datetimeFigureOut">
               <a:rPr lang="fr-FR" smtClean="0"/>
-              <a:t>06/09/2023</a:t>
+              <a:t>07/09/2023</a:t>
             </a:fld>
             <a:endParaRPr lang="fr-FR"/>
           </a:p>
@@ -4479,7 +4479,7 @@
           <a:p>
             <a:fld id="{6A4922AC-46CB-49BF-90C3-10269EC4F5A8}" type="datetimeFigureOut">
               <a:rPr lang="fr-FR" smtClean="0"/>
-              <a:t>06/09/2023</a:t>
+              <a:t>07/09/2023</a:t>
             </a:fld>
             <a:endParaRPr lang="fr-FR"/>
           </a:p>
@@ -4790,7 +4790,7 @@
           <a:p>
             <a:fld id="{6A4922AC-46CB-49BF-90C3-10269EC4F5A8}" type="datetimeFigureOut">
               <a:rPr lang="fr-FR" smtClean="0"/>
-              <a:t>06/09/2023</a:t>
+              <a:t>07/09/2023</a:t>
             </a:fld>
             <a:endParaRPr lang="fr-FR"/>
           </a:p>
@@ -5078,7 +5078,7 @@
           <a:p>
             <a:fld id="{6A4922AC-46CB-49BF-90C3-10269EC4F5A8}" type="datetimeFigureOut">
               <a:rPr lang="fr-FR" smtClean="0"/>
-              <a:t>06/09/2023</a:t>
+              <a:t>07/09/2023</a:t>
             </a:fld>
             <a:endParaRPr lang="fr-FR"/>
           </a:p>
@@ -5319,7 +5319,7 @@
           <a:p>
             <a:fld id="{6A4922AC-46CB-49BF-90C3-10269EC4F5A8}" type="datetimeFigureOut">
               <a:rPr lang="fr-FR" smtClean="0"/>
-              <a:t>06/09/2023</a:t>
+              <a:t>07/09/2023</a:t>
             </a:fld>
             <a:endParaRPr lang="fr-FR"/>
           </a:p>
@@ -5843,6 +5843,17 @@
           <a:lstStyle/>
           <a:p>
             <a:r>
+              <a:rPr lang="en-US" sz="2800" kern="1200" dirty="0">
+                <a:solidFill>
+                  <a:srgbClr val="FFFFFF"/>
+                </a:solidFill>
+                <a:latin typeface="+mj-lt"/>
+                <a:ea typeface="+mj-ea"/>
+                <a:cs typeface="+mj-cs"/>
+              </a:rPr>
+              <a:t>P13. </a:t>
+            </a:r>
+            <a:r>
               <a:rPr lang="en-US" sz="2800" kern="1200">
                 <a:solidFill>
                   <a:srgbClr val="FFFFFF"/>
@@ -5851,8 +5862,16 @@
                 <a:ea typeface="+mj-ea"/>
                 <a:cs typeface="+mj-cs"/>
               </a:rPr>
-              <a:t>P13. ArgentBank</a:t>
+              <a:t>ArgentBank</a:t>
             </a:r>
+            <a:endParaRPr lang="en-US" sz="2800" kern="1200" dirty="0">
+              <a:solidFill>
+                <a:srgbClr val="FFFFFF"/>
+              </a:solidFill>
+              <a:latin typeface="+mj-lt"/>
+              <a:ea typeface="+mj-ea"/>
+              <a:cs typeface="+mj-cs"/>
+            </a:endParaRPr>
           </a:p>
         </p:txBody>
       </p:sp>
@@ -6380,8 +6399,12 @@
               <a:buAutoNum type="arabicPeriod"/>
             </a:pPr>
             <a:r>
+              <a:rPr lang="fr-FR" sz="2400"/>
+              <a:t>Contexte </a:t>
+            </a:r>
+            <a:r>
               <a:rPr lang="fr-FR" sz="2400" dirty="0"/>
-              <a:t>Contexte du Projet</a:t>
+              <a:t>du Projet</a:t>
             </a:r>
           </a:p>
           <a:p>

</xml_diff>